<commit_message>
Added Project Update Slides for 7Mar18
Corrected Project Schedule
</commit_message>
<xml_diff>
--- a/SGW Project Update 7Mar18.pptx
+++ b/SGW Project Update 7Mar18.pptx
@@ -6103,11 +6103,7 @@
             </a:pPr>
             <a:r>
               <a:rPr lang="en-US" sz="3000" dirty="0" smtClean="0"/>
-              <a:t>Updated app from PHP 5.6 to </a:t>
-            </a:r>
-            <a:r>
-              <a:rPr lang="en-US" sz="3000" dirty="0" smtClean="0"/>
-              <a:t>7.2</a:t>
+              <a:t>Updated app from PHP 5.6 to 7.2</a:t>
             </a:r>
           </a:p>
           <a:p>
@@ -7324,7 +7320,7 @@
       </p:sp>
       <p:pic>
         <p:nvPicPr>
-          <p:cNvPr id="7170" name="Picture 2"/>
+          <p:cNvPr id="1026" name="Picture 2"/>
           <p:cNvPicPr>
             <a:picLocks noChangeAspect="1" noChangeArrowheads="1"/>
           </p:cNvPicPr>
@@ -7345,8 +7341,8 @@
         </p:blipFill>
         <p:spPr bwMode="auto">
           <a:xfrm>
-            <a:off x="52450" y="1540085"/>
-            <a:ext cx="9067800" cy="5206090"/>
+            <a:off x="35626" y="1539619"/>
+            <a:ext cx="9067800" cy="5242181"/>
           </a:xfrm>
           <a:prstGeom prst="rect">
             <a:avLst/>
@@ -8205,13 +8201,8 @@
             </a:pPr>
             <a:r>
               <a:rPr lang="en-US" dirty="0" smtClean="0"/>
-              <a:t>Establish </a:t>
-            </a:r>
-            <a:r>
-              <a:rPr lang="en-US" dirty="0" smtClean="0"/>
-              <a:t>Admin Documentation &amp; Video Tutorials</a:t>
-            </a:r>
-            <a:endParaRPr lang="en-US" dirty="0" smtClean="0"/>
+              <a:t>Establish Admin Documentation &amp; Video Tutorials</a:t>
+            </a:r>
           </a:p>
           <a:p>
             <a:pPr lvl="1">

</xml_diff>